<commit_message>
added click to expand
</commit_message>
<xml_diff>
--- a/img/project_imgs.pptx
+++ b/img/project_imgs.pptx
@@ -6,6 +6,7 @@
   </p:sldMasterIdLst>
   <p:sldIdLst>
     <p:sldId id="256" r:id="rId2"/>
+    <p:sldId id="257" r:id="rId3"/>
   </p:sldIdLst>
   <p:sldSz cx="12192000" cy="6858000"/>
   <p:notesSz cx="6858000" cy="9144000"/>
@@ -104,6 +105,11 @@
       </a:defRPr>
     </a:lvl9pPr>
   </p:defaultTextStyle>
+  <p:extLst>
+    <p:ext uri="{EFAFB233-063F-42B5-8137-9DF3F51BA10A}">
+      <p15:sldGuideLst xmlns:p15="http://schemas.microsoft.com/office/powerpoint/2012/main"/>
+    </p:ext>
+  </p:extLst>
 </p:presentation>
 </file>
 
@@ -254,7 +260,7 @@
           <a:p>
             <a:fld id="{B06D02F2-60B9-3541-A0D3-A2CD9FD1F494}" type="datetimeFigureOut">
               <a:rPr lang="en-US" smtClean="0"/>
-              <a:t>9/4/24</a:t>
+              <a:t>9/5/24</a:t>
             </a:fld>
             <a:endParaRPr lang="en-US"/>
           </a:p>
@@ -452,7 +458,7 @@
           <a:p>
             <a:fld id="{B06D02F2-60B9-3541-A0D3-A2CD9FD1F494}" type="datetimeFigureOut">
               <a:rPr lang="en-US" smtClean="0"/>
-              <a:t>9/4/24</a:t>
+              <a:t>9/5/24</a:t>
             </a:fld>
             <a:endParaRPr lang="en-US"/>
           </a:p>
@@ -660,7 +666,7 @@
           <a:p>
             <a:fld id="{B06D02F2-60B9-3541-A0D3-A2CD9FD1F494}" type="datetimeFigureOut">
               <a:rPr lang="en-US" smtClean="0"/>
-              <a:t>9/4/24</a:t>
+              <a:t>9/5/24</a:t>
             </a:fld>
             <a:endParaRPr lang="en-US"/>
           </a:p>
@@ -858,7 +864,7 @@
           <a:p>
             <a:fld id="{B06D02F2-60B9-3541-A0D3-A2CD9FD1F494}" type="datetimeFigureOut">
               <a:rPr lang="en-US" smtClean="0"/>
-              <a:t>9/4/24</a:t>
+              <a:t>9/5/24</a:t>
             </a:fld>
             <a:endParaRPr lang="en-US"/>
           </a:p>
@@ -1133,7 +1139,7 @@
           <a:p>
             <a:fld id="{B06D02F2-60B9-3541-A0D3-A2CD9FD1F494}" type="datetimeFigureOut">
               <a:rPr lang="en-US" smtClean="0"/>
-              <a:t>9/4/24</a:t>
+              <a:t>9/5/24</a:t>
             </a:fld>
             <a:endParaRPr lang="en-US"/>
           </a:p>
@@ -1398,7 +1404,7 @@
           <a:p>
             <a:fld id="{B06D02F2-60B9-3541-A0D3-A2CD9FD1F494}" type="datetimeFigureOut">
               <a:rPr lang="en-US" smtClean="0"/>
-              <a:t>9/4/24</a:t>
+              <a:t>9/5/24</a:t>
             </a:fld>
             <a:endParaRPr lang="en-US"/>
           </a:p>
@@ -1810,7 +1816,7 @@
           <a:p>
             <a:fld id="{B06D02F2-60B9-3541-A0D3-A2CD9FD1F494}" type="datetimeFigureOut">
               <a:rPr lang="en-US" smtClean="0"/>
-              <a:t>9/4/24</a:t>
+              <a:t>9/5/24</a:t>
             </a:fld>
             <a:endParaRPr lang="en-US"/>
           </a:p>
@@ -1951,7 +1957,7 @@
           <a:p>
             <a:fld id="{B06D02F2-60B9-3541-A0D3-A2CD9FD1F494}" type="datetimeFigureOut">
               <a:rPr lang="en-US" smtClean="0"/>
-              <a:t>9/4/24</a:t>
+              <a:t>9/5/24</a:t>
             </a:fld>
             <a:endParaRPr lang="en-US"/>
           </a:p>
@@ -2064,7 +2070,7 @@
           <a:p>
             <a:fld id="{B06D02F2-60B9-3541-A0D3-A2CD9FD1F494}" type="datetimeFigureOut">
               <a:rPr lang="en-US" smtClean="0"/>
-              <a:t>9/4/24</a:t>
+              <a:t>9/5/24</a:t>
             </a:fld>
             <a:endParaRPr lang="en-US"/>
           </a:p>
@@ -2375,7 +2381,7 @@
           <a:p>
             <a:fld id="{B06D02F2-60B9-3541-A0D3-A2CD9FD1F494}" type="datetimeFigureOut">
               <a:rPr lang="en-US" smtClean="0"/>
-              <a:t>9/4/24</a:t>
+              <a:t>9/5/24</a:t>
             </a:fld>
             <a:endParaRPr lang="en-US"/>
           </a:p>
@@ -2663,7 +2669,7 @@
           <a:p>
             <a:fld id="{B06D02F2-60B9-3541-A0D3-A2CD9FD1F494}" type="datetimeFigureOut">
               <a:rPr lang="en-US" smtClean="0"/>
-              <a:t>9/4/24</a:t>
+              <a:t>9/5/24</a:t>
             </a:fld>
             <a:endParaRPr lang="en-US"/>
           </a:p>
@@ -2904,7 +2910,7 @@
           <a:p>
             <a:fld id="{B06D02F2-60B9-3541-A0D3-A2CD9FD1F494}" type="datetimeFigureOut">
               <a:rPr lang="en-US" smtClean="0"/>
-              <a:t>9/4/24</a:t>
+              <a:t>9/5/24</a:t>
             </a:fld>
             <a:endParaRPr lang="en-US"/>
           </a:p>
@@ -4622,6 +4628,66 @@
 </p:sld>
 </file>
 
+<file path=ppt/slides/slide2.xml><?xml version="1.0" encoding="utf-8"?>
+<p:sld xmlns:a="http://schemas.openxmlformats.org/drawingml/2006/main" xmlns:r="http://schemas.openxmlformats.org/officeDocument/2006/relationships" xmlns:p="http://schemas.openxmlformats.org/presentationml/2006/main">
+  <p:cSld>
+    <p:spTree>
+      <p:nvGrpSpPr>
+        <p:cNvPr id="1" name=""/>
+        <p:cNvGrpSpPr/>
+        <p:nvPr/>
+      </p:nvGrpSpPr>
+      <p:grpSpPr>
+        <a:xfrm>
+          <a:off x="0" y="0"/>
+          <a:ext cx="0" cy="0"/>
+          <a:chOff x="0" y="0"/>
+          <a:chExt cx="0" cy="0"/>
+        </a:xfrm>
+      </p:grpSpPr>
+      <p:pic>
+        <p:nvPicPr>
+          <p:cNvPr id="10" name="Picture 9">
+            <a:extLst>
+              <a:ext uri="{FF2B5EF4-FFF2-40B4-BE49-F238E27FC236}">
+                <a16:creationId xmlns:a16="http://schemas.microsoft.com/office/drawing/2014/main" id="{68D4F03B-BC49-69B2-379C-B78941DDEB87}"/>
+              </a:ext>
+            </a:extLst>
+          </p:cNvPr>
+          <p:cNvPicPr>
+            <a:picLocks noChangeAspect="1"/>
+          </p:cNvPicPr>
+          <p:nvPr/>
+        </p:nvPicPr>
+        <p:blipFill>
+          <a:blip r:embed="rId2"/>
+          <a:stretch>
+            <a:fillRect/>
+          </a:stretch>
+        </p:blipFill>
+        <p:spPr>
+          <a:xfrm>
+            <a:off x="210880" y="1852846"/>
+            <a:ext cx="11369254" cy="2974336"/>
+          </a:xfrm>
+          <a:prstGeom prst="rect">
+            <a:avLst/>
+          </a:prstGeom>
+        </p:spPr>
+      </p:pic>
+    </p:spTree>
+    <p:extLst>
+      <p:ext uri="{BB962C8B-B14F-4D97-AF65-F5344CB8AC3E}">
+        <p14:creationId xmlns:p14="http://schemas.microsoft.com/office/powerpoint/2010/main" val="806380836"/>
+      </p:ext>
+    </p:extLst>
+  </p:cSld>
+  <p:clrMapOvr>
+    <a:masterClrMapping/>
+  </p:clrMapOvr>
+</p:sld>
+</file>
+
 <file path=ppt/theme/theme1.xml><?xml version="1.0" encoding="utf-8"?>
 <a:theme xmlns:a="http://schemas.openxmlformats.org/drawingml/2006/main" name="Office Theme">
   <a:themeElements>

</xml_diff>